<commit_message>
update study group content
</commit_message>
<xml_diff>
--- a/ppt/angular_performance.pptx
+++ b/ppt/angular_performance.pptx
@@ -236,7 +236,7 @@
             <a:fld id="{3CDD3A71-4C75-488C-A8F3-A1F163ED0DB9}" type="datetimeFigureOut">
               <a:rPr lang="en-US" smtClean="0"/>
               <a:pPr/>
-              <a:t>7/29/2019</a:t>
+              <a:t>7/30/2019</a:t>
             </a:fld>
             <a:endParaRPr lang="en-US"/>
           </a:p>
@@ -404,7 +404,7 @@
             <a:fld id="{523CC419-8FB3-4D1C-8127-E63C1A13459D}" type="datetimeFigureOut">
               <a:rPr lang="en-US" smtClean="0"/>
               <a:pPr/>
-              <a:t>7/29/2019</a:t>
+              <a:t>7/30/2019</a:t>
             </a:fld>
             <a:endParaRPr lang="en-US"/>
           </a:p>
@@ -673,6 +673,119 @@
     </a:lvl9pPr>
   </p:notesStyle>
 </p:notesMaster>
+</file>
+
+<file path=ppt/notesSlides/notesSlide1.xml><?xml version="1.0" encoding="utf-8"?>
+<p:notes xmlns:a="http://schemas.openxmlformats.org/drawingml/2006/main" xmlns:r="http://schemas.openxmlformats.org/officeDocument/2006/relationships" xmlns:p="http://schemas.openxmlformats.org/presentationml/2006/main">
+  <p:cSld>
+    <p:spTree>
+      <p:nvGrpSpPr>
+        <p:cNvPr id="1" name=""/>
+        <p:cNvGrpSpPr/>
+        <p:nvPr/>
+      </p:nvGrpSpPr>
+      <p:grpSpPr>
+        <a:xfrm>
+          <a:off x="0" y="0"/>
+          <a:ext cx="0" cy="0"/>
+          <a:chOff x="0" y="0"/>
+          <a:chExt cx="0" cy="0"/>
+        </a:xfrm>
+      </p:grpSpPr>
+      <p:sp>
+        <p:nvSpPr>
+          <p:cNvPr id="2" name="投影片圖像版面配置區 1"/>
+          <p:cNvSpPr>
+            <a:spLocks noGrp="1" noRot="1" noChangeAspect="1"/>
+          </p:cNvSpPr>
+          <p:nvPr>
+            <p:ph type="sldImg"/>
+          </p:nvPr>
+        </p:nvSpPr>
+        <p:spPr/>
+      </p:sp>
+      <p:sp>
+        <p:nvSpPr>
+          <p:cNvPr id="3" name="備忘稿版面配置區 2"/>
+          <p:cNvSpPr>
+            <a:spLocks noGrp="1"/>
+          </p:cNvSpPr>
+          <p:nvPr>
+            <p:ph type="body" idx="1"/>
+          </p:nvPr>
+        </p:nvSpPr>
+        <p:spPr/>
+        <p:txBody>
+          <a:bodyPr/>
+          <a:lstStyle/>
+          <a:p>
+            <a:pPr marL="0" indent="0">
+              <a:buNone/>
+            </a:pPr>
+            <a:r>
+              <a:rPr lang="zh-TW" altLang="en-US" b="0" dirty="0" smtClean="0"/>
+              <a:t>將所有的所使用的</a:t>
+            </a:r>
+            <a:r>
+              <a:rPr lang="en-US" altLang="zh-TW" b="0" dirty="0" smtClean="0"/>
+              <a:t>library</a:t>
+            </a:r>
+            <a:r>
+              <a:rPr lang="zh-TW" altLang="en-US" b="0" dirty="0" smtClean="0"/>
+              <a:t>和許多應用綁在一起</a:t>
+            </a:r>
+            <a:endParaRPr lang="en-US" altLang="zh-TW" b="0" dirty="0" smtClean="0"/>
+          </a:p>
+          <a:p>
+            <a:pPr marL="0" indent="0">
+              <a:buNone/>
+            </a:pPr>
+            <a:r>
+              <a:rPr lang="zh-TW" altLang="en-US" b="0" dirty="0" smtClean="0"/>
+              <a:t>消除死代碼：刪除未引用的模塊和很多未使用的代碼</a:t>
+            </a:r>
+            <a:endParaRPr lang="en-US" altLang="zh-TW" b="0" dirty="0" smtClean="0"/>
+          </a:p>
+          <a:p>
+            <a:pPr marL="0" indent="0">
+              <a:buNone/>
+            </a:pPr>
+            <a:r>
+              <a:rPr lang="en-US" altLang="zh-TW" b="0" dirty="0" err="1" smtClean="0"/>
+              <a:t>Uglification</a:t>
+            </a:r>
+            <a:r>
+              <a:rPr lang="zh-TW" altLang="en-US" b="0" dirty="0" smtClean="0"/>
+              <a:t>：將變數名稱做混淆的動作。</a:t>
+            </a:r>
+            <a:endParaRPr lang="en-US" altLang="zh-TW" b="0" dirty="0" smtClean="0"/>
+          </a:p>
+          <a:p>
+            <a:pPr marL="0" indent="0">
+              <a:buNone/>
+            </a:pPr>
+            <a:r>
+              <a:rPr lang="zh-TW" altLang="en-US" b="0" dirty="0" smtClean="0"/>
+              <a:t>縮小檔案：刪除多餘的空白，註釋和可選的令牌。</a:t>
+            </a:r>
+            <a:endParaRPr lang="en-US" altLang="zh-TW" b="0" dirty="0" smtClean="0"/>
+          </a:p>
+          <a:p>
+            <a:endParaRPr lang="zh-TW" altLang="en-US" dirty="0"/>
+          </a:p>
+        </p:txBody>
+      </p:sp>
+    </p:spTree>
+    <p:extLst>
+      <p:ext uri="{BB962C8B-B14F-4D97-AF65-F5344CB8AC3E}">
+        <p14:creationId xmlns:p14="http://schemas.microsoft.com/office/powerpoint/2010/main" val="2334019523"/>
+      </p:ext>
+    </p:extLst>
+  </p:cSld>
+  <p:clrMapOvr>
+    <a:masterClrMapping/>
+  </p:clrMapOvr>
+</p:notes>
 </file>
 
 <file path=ppt/slideLayouts/slideLayout1.xml><?xml version="1.0" encoding="utf-8"?>
@@ -3173,7 +3286,7 @@
           <p:cNvPr id="2" name="Title 1">
             <a:extLst>
               <a:ext uri="{FF2B5EF4-FFF2-40B4-BE49-F238E27FC236}">
-                <a16:creationId xmlns="" xmlns:a16="http://schemas.microsoft.com/office/drawing/2014/main" id="{E5D678AA-48A1-4490-9394-8643B8860FCB}"/>
+                <a16:creationId xmlns:a16="http://schemas.microsoft.com/office/drawing/2014/main" xmlns="" id="{E5D678AA-48A1-4490-9394-8643B8860FCB}"/>
               </a:ext>
             </a:extLst>
           </p:cNvPr>
@@ -3201,7 +3314,7 @@
           <p:cNvPr id="3" name="Content Placeholder 2">
             <a:extLst>
               <a:ext uri="{FF2B5EF4-FFF2-40B4-BE49-F238E27FC236}">
-                <a16:creationId xmlns="" xmlns:a16="http://schemas.microsoft.com/office/drawing/2014/main" id="{EA49B8AA-B17F-4F47-9489-2AEA4FEBA855}"/>
+                <a16:creationId xmlns:a16="http://schemas.microsoft.com/office/drawing/2014/main" xmlns="" id="{EA49B8AA-B17F-4F47-9489-2AEA4FEBA855}"/>
               </a:ext>
             </a:extLst>
           </p:cNvPr>
@@ -3279,12 +3392,21 @@
             </a:r>
             <a:r>
               <a:rPr lang="en-US" altLang="zh-TW" dirty="0"/>
-              <a:t> build -prod --output-hashing </a:t>
+              <a:t> build </a:t>
             </a:r>
             <a:r>
               <a:rPr lang="en-US" altLang="zh-TW" dirty="0" smtClean="0"/>
-              <a:t>all</a:t>
-            </a:r>
+              <a:t>--</a:t>
+            </a:r>
+            <a:r>
+              <a:rPr lang="en-US" altLang="zh-TW" dirty="0"/>
+              <a:t>prod --output-hashing </a:t>
+            </a:r>
+            <a:r>
+              <a:rPr lang="en-US" altLang="zh-TW" dirty="0" smtClean="0"/>
+              <a:t>all (all | none | media | bundle)</a:t>
+            </a:r>
+            <a:endParaRPr lang="en-US" altLang="zh-TW" dirty="0" smtClean="0"/>
           </a:p>
           <a:p>
             <a:pPr marL="0" indent="0">
@@ -3294,14 +3416,14 @@
               <a:rPr lang="en-US" altLang="zh-TW" dirty="0">
                 <a:hlinkClick r:id="rId2"/>
               </a:rPr>
-              <a:t>https://poychang.github.io/disable-browser-cache-on-angular-site/</a:t>
-            </a:r>
-            <a:endParaRPr lang="en-US" altLang="zh-TW" dirty="0"/>
-          </a:p>
-          <a:p>
-            <a:pPr marL="0" indent="0">
-              <a:buNone/>
-            </a:pPr>
+              <a:t>https://poychang.github.io/disable-browser-cache-on-angular-site</a:t>
+            </a:r>
+            <a:r>
+              <a:rPr lang="en-US" altLang="zh-TW" dirty="0" smtClean="0">
+                <a:hlinkClick r:id="rId2"/>
+              </a:rPr>
+              <a:t>/</a:t>
+            </a:r>
             <a:endParaRPr lang="zh-TW" altLang="en-US" dirty="0"/>
           </a:p>
           <a:p>
@@ -3417,7 +3539,28 @@
             </a:pPr>
             <a:r>
               <a:rPr lang="en-US" dirty="0" smtClean="0"/>
-              <a:t>4.Service Worker</a:t>
+              <a:t>4.Service </a:t>
+            </a:r>
+            <a:r>
+              <a:rPr lang="en-US" dirty="0" smtClean="0"/>
+              <a:t>Worker</a:t>
+            </a:r>
+          </a:p>
+          <a:p>
+            <a:pPr marL="0" indent="0">
+              <a:buNone/>
+            </a:pPr>
+            <a:r>
+              <a:rPr lang="en-US" dirty="0" smtClean="0"/>
+              <a:t>5.Web </a:t>
+            </a:r>
+            <a:r>
+              <a:rPr lang="en-US" dirty="0" err="1" smtClean="0"/>
+              <a:t>api</a:t>
+            </a:r>
+            <a:r>
+              <a:rPr lang="en-US" dirty="0" smtClean="0"/>
+              <a:t> Cache</a:t>
             </a:r>
             <a:endParaRPr lang="en-US" dirty="0"/>
           </a:p>
@@ -3446,7 +3589,7 @@
           <p:cNvPr id="4" name="Slide Number Placeholder 3">
             <a:extLst>
               <a:ext uri="{FF2B5EF4-FFF2-40B4-BE49-F238E27FC236}">
-                <a16:creationId xmlns="" xmlns:a16="http://schemas.microsoft.com/office/drawing/2014/main" id="{37BB747A-5129-47C0-9046-EF7E7C12EFC2}"/>
+                <a16:creationId xmlns:a16="http://schemas.microsoft.com/office/drawing/2014/main" xmlns="" id="{37BB747A-5129-47C0-9046-EF7E7C12EFC2}"/>
               </a:ext>
             </a:extLst>
           </p:cNvPr>
@@ -3586,7 +3729,7 @@
           <p:cNvPr id="2" name="Title 1">
             <a:extLst>
               <a:ext uri="{FF2B5EF4-FFF2-40B4-BE49-F238E27FC236}">
-                <a16:creationId xmlns="" xmlns:a16="http://schemas.microsoft.com/office/drawing/2014/main" id="{19BE3664-535A-4792-A501-B4FDD5D75620}"/>
+                <a16:creationId xmlns:a16="http://schemas.microsoft.com/office/drawing/2014/main" xmlns="" id="{19BE3664-535A-4792-A501-B4FDD5D75620}"/>
               </a:ext>
             </a:extLst>
           </p:cNvPr>
@@ -3619,7 +3762,7 @@
           <p:cNvPr id="3" name="Content Placeholder 2">
             <a:extLst>
               <a:ext uri="{FF2B5EF4-FFF2-40B4-BE49-F238E27FC236}">
-                <a16:creationId xmlns="" xmlns:a16="http://schemas.microsoft.com/office/drawing/2014/main" id="{6DBE8D3E-7C25-44DD-8B72-3F9FAA2F4866}"/>
+                <a16:creationId xmlns:a16="http://schemas.microsoft.com/office/drawing/2014/main" xmlns="" id="{6DBE8D3E-7C25-44DD-8B72-3F9FAA2F4866}"/>
               </a:ext>
             </a:extLst>
           </p:cNvPr>
@@ -3706,7 +3849,7 @@
           <p:cNvPr id="4" name="Slide Number Placeholder 3">
             <a:extLst>
               <a:ext uri="{FF2B5EF4-FFF2-40B4-BE49-F238E27FC236}">
-                <a16:creationId xmlns="" xmlns:a16="http://schemas.microsoft.com/office/drawing/2014/main" id="{FCBDD51D-8165-4FAF-86F9-F6D2F57249BB}"/>
+                <a16:creationId xmlns:a16="http://schemas.microsoft.com/office/drawing/2014/main" xmlns="" id="{FCBDD51D-8165-4FAF-86F9-F6D2F57249BB}"/>
               </a:ext>
             </a:extLst>
           </p:cNvPr>
@@ -3736,7 +3879,7 @@
           <p:cNvPr id="1026" name="Picture 2" descr="image">
             <a:extLst>
               <a:ext uri="{FF2B5EF4-FFF2-40B4-BE49-F238E27FC236}">
-                <a16:creationId xmlns="" xmlns:a16="http://schemas.microsoft.com/office/drawing/2014/main" id="{E0719DBF-0CA0-4FC2-9F4F-74DDF27F8AE6}"/>
+                <a16:creationId xmlns:a16="http://schemas.microsoft.com/office/drawing/2014/main" xmlns="" id="{E0719DBF-0CA0-4FC2-9F4F-74DDF27F8AE6}"/>
               </a:ext>
             </a:extLst>
           </p:cNvPr>
@@ -3813,7 +3956,7 @@
           <p:cNvPr id="2" name="Title 1">
             <a:extLst>
               <a:ext uri="{FF2B5EF4-FFF2-40B4-BE49-F238E27FC236}">
-                <a16:creationId xmlns="" xmlns:a16="http://schemas.microsoft.com/office/drawing/2014/main" id="{3A48E285-584F-425D-B674-F5D5ABCE8A61}"/>
+                <a16:creationId xmlns:a16="http://schemas.microsoft.com/office/drawing/2014/main" xmlns="" id="{3A48E285-584F-425D-B674-F5D5ABCE8A61}"/>
               </a:ext>
             </a:extLst>
           </p:cNvPr>
@@ -3846,7 +3989,7 @@
           <p:cNvPr id="3" name="Content Placeholder 2">
             <a:extLst>
               <a:ext uri="{FF2B5EF4-FFF2-40B4-BE49-F238E27FC236}">
-                <a16:creationId xmlns="" xmlns:a16="http://schemas.microsoft.com/office/drawing/2014/main" id="{95194AC0-4DB1-4FB2-9435-A0E35585D5E8}"/>
+                <a16:creationId xmlns:a16="http://schemas.microsoft.com/office/drawing/2014/main" xmlns="" id="{95194AC0-4DB1-4FB2-9435-A0E35585D5E8}"/>
               </a:ext>
             </a:extLst>
           </p:cNvPr>
@@ -3859,7 +4002,9 @@
         </p:nvSpPr>
         <p:spPr/>
         <p:txBody>
-          <a:bodyPr/>
+          <a:bodyPr>
+            <a:normAutofit/>
+          </a:bodyPr>
           <a:lstStyle/>
           <a:p>
             <a:r>
@@ -4014,12 +4159,95 @@
             </a:r>
             <a:r>
               <a:rPr lang="en-US" dirty="0"/>
-              <a:t> serve --</a:t>
-            </a:r>
-            <a:r>
-              <a:rPr lang="en-US" dirty="0" err="1"/>
+              <a:t> serve </a:t>
+            </a:r>
+            <a:r>
+              <a:rPr lang="en-US" dirty="0" smtClean="0"/>
+              <a:t>–</a:t>
+            </a:r>
+            <a:r>
+              <a:rPr lang="en-US" dirty="0" err="1" smtClean="0"/>
               <a:t>aot</a:t>
             </a:r>
+            <a:endParaRPr lang="en-US" dirty="0" smtClean="0"/>
+          </a:p>
+          <a:p>
+            <a:pPr marL="0" indent="0">
+              <a:buNone/>
+            </a:pPr>
+            <a:endParaRPr lang="en-US" altLang="zh-TW" b="0" dirty="0" smtClean="0"/>
+          </a:p>
+          <a:p>
+            <a:pPr marL="0" indent="0">
+              <a:buNone/>
+            </a:pPr>
+            <a:r>
+              <a:rPr lang="zh-TW" altLang="en-US" b="0" dirty="0" smtClean="0"/>
+              <a:t>縮小檔案</a:t>
+            </a:r>
+            <a:endParaRPr lang="en-US" altLang="zh-TW" b="0" dirty="0" smtClean="0"/>
+          </a:p>
+          <a:p>
+            <a:pPr marL="0" indent="0">
+              <a:buNone/>
+            </a:pPr>
+            <a:r>
+              <a:rPr lang="en-US" altLang="zh-TW" b="0" dirty="0" smtClean="0"/>
+              <a:t>--</a:t>
+            </a:r>
+            <a:r>
+              <a:rPr lang="en-US" altLang="zh-TW" b="0" dirty="0" err="1" smtClean="0"/>
+              <a:t>buildOptimizer</a:t>
+            </a:r>
+            <a:r>
+              <a:rPr lang="en-US" altLang="zh-TW" b="0" dirty="0" smtClean="0"/>
+              <a:t>  ( need </a:t>
+            </a:r>
+            <a:r>
+              <a:rPr lang="en-US" altLang="zh-TW" b="0" dirty="0" err="1" smtClean="0"/>
+              <a:t>aot</a:t>
+            </a:r>
+            <a:r>
+              <a:rPr lang="en-US" altLang="zh-TW" b="0" dirty="0" smtClean="0"/>
+              <a:t>) </a:t>
+            </a:r>
+          </a:p>
+          <a:p>
+            <a:pPr marL="0" indent="0">
+              <a:buNone/>
+            </a:pPr>
+            <a:r>
+              <a:rPr lang="en-US" altLang="zh-TW" b="0"/>
+              <a:t>--</a:t>
+            </a:r>
+            <a:r>
+              <a:rPr lang="en-US" altLang="zh-TW" b="0"/>
+              <a:t>optimization </a:t>
+            </a:r>
+            <a:endParaRPr lang="en-US" altLang="zh-TW" b="0" dirty="0"/>
+          </a:p>
+          <a:p>
+            <a:pPr marL="0" indent="0">
+              <a:buNone/>
+            </a:pPr>
+            <a:endParaRPr lang="zh-TW" altLang="en-US" b="0" dirty="0"/>
+          </a:p>
+          <a:p>
+            <a:pPr marL="0" indent="0">
+              <a:buNone/>
+            </a:pPr>
+            <a:endParaRPr lang="zh-TW" altLang="en-US" b="0" dirty="0"/>
+          </a:p>
+          <a:p>
+            <a:pPr marL="0" indent="0">
+              <a:buNone/>
+            </a:pPr>
+            <a:endParaRPr lang="en-US" altLang="zh-TW" b="0" dirty="0"/>
+          </a:p>
+          <a:p>
+            <a:pPr marL="0" indent="0">
+              <a:buNone/>
+            </a:pPr>
             <a:endParaRPr lang="en-US" dirty="0"/>
           </a:p>
         </p:txBody>
@@ -4029,7 +4257,7 @@
           <p:cNvPr id="4" name="Slide Number Placeholder 3">
             <a:extLst>
               <a:ext uri="{FF2B5EF4-FFF2-40B4-BE49-F238E27FC236}">
-                <a16:creationId xmlns="" xmlns:a16="http://schemas.microsoft.com/office/drawing/2014/main" id="{C694A819-ED1A-48B8-8D88-AF4044974888}"/>
+                <a16:creationId xmlns:a16="http://schemas.microsoft.com/office/drawing/2014/main" xmlns="" id="{C694A819-ED1A-48B8-8D88-AF4044974888}"/>
               </a:ext>
             </a:extLst>
           </p:cNvPr>
@@ -4089,7 +4317,7 @@
           <p:cNvPr id="2" name="Title 1">
             <a:extLst>
               <a:ext uri="{FF2B5EF4-FFF2-40B4-BE49-F238E27FC236}">
-                <a16:creationId xmlns="" xmlns:a16="http://schemas.microsoft.com/office/drawing/2014/main" id="{3D17F768-F0A5-4D76-8A54-4E475517A6D9}"/>
+                <a16:creationId xmlns:a16="http://schemas.microsoft.com/office/drawing/2014/main" xmlns="" id="{3D17F768-F0A5-4D76-8A54-4E475517A6D9}"/>
               </a:ext>
             </a:extLst>
           </p:cNvPr>
@@ -4117,7 +4345,7 @@
           <p:cNvPr id="6" name="Content Placeholder 5">
             <a:extLst>
               <a:ext uri="{FF2B5EF4-FFF2-40B4-BE49-F238E27FC236}">
-                <a16:creationId xmlns="" xmlns:a16="http://schemas.microsoft.com/office/drawing/2014/main" id="{507945AC-55CB-40F6-B45A-11AAABD28A31}"/>
+                <a16:creationId xmlns:a16="http://schemas.microsoft.com/office/drawing/2014/main" xmlns="" id="{507945AC-55CB-40F6-B45A-11AAABD28A31}"/>
               </a:ext>
             </a:extLst>
           </p:cNvPr>
@@ -4147,7 +4375,7 @@
                 <a:gridCol w="7772400">
                   <a:extLst>
                     <a:ext uri="{9D8B030D-6E8A-4147-A177-3AD203B41FA5}">
-                      <a16:colId xmlns="" xmlns:a16="http://schemas.microsoft.com/office/drawing/2014/main" val="1199065692"/>
+                      <a16:colId xmlns:a16="http://schemas.microsoft.com/office/drawing/2014/main" xmlns="" val="1199065692"/>
                     </a:ext>
                   </a:extLst>
                 </a:gridCol>
@@ -4168,7 +4396,7 @@
                 </a:tc>
                 <a:extLst>
                   <a:ext uri="{0D108BD9-81ED-4DB2-BD59-A6C34878D82A}">
-                    <a16:rowId xmlns="" xmlns:a16="http://schemas.microsoft.com/office/drawing/2014/main" val="1767338010"/>
+                    <a16:rowId xmlns:a16="http://schemas.microsoft.com/office/drawing/2014/main" xmlns="" val="1767338010"/>
                   </a:ext>
                 </a:extLst>
               </a:tr>
@@ -4591,7 +4819,7 @@
                 </a:tc>
                 <a:extLst>
                   <a:ext uri="{0D108BD9-81ED-4DB2-BD59-A6C34878D82A}">
-                    <a16:rowId xmlns="" xmlns:a16="http://schemas.microsoft.com/office/drawing/2014/main" val="2317173366"/>
+                    <a16:rowId xmlns:a16="http://schemas.microsoft.com/office/drawing/2014/main" xmlns="" val="2317173366"/>
                   </a:ext>
                 </a:extLst>
               </a:tr>
@@ -4604,7 +4832,7 @@
           <p:cNvPr id="4" name="Slide Number Placeholder 3">
             <a:extLst>
               <a:ext uri="{FF2B5EF4-FFF2-40B4-BE49-F238E27FC236}">
-                <a16:creationId xmlns="" xmlns:a16="http://schemas.microsoft.com/office/drawing/2014/main" id="{6C7A083D-7634-46C8-9481-4C324742DDC4}"/>
+                <a16:creationId xmlns:a16="http://schemas.microsoft.com/office/drawing/2014/main" xmlns="" id="{6C7A083D-7634-46C8-9481-4C324742DDC4}"/>
               </a:ext>
             </a:extLst>
           </p:cNvPr>
@@ -4664,7 +4892,7 @@
           <p:cNvPr id="2" name="Title 1">
             <a:extLst>
               <a:ext uri="{FF2B5EF4-FFF2-40B4-BE49-F238E27FC236}">
-                <a16:creationId xmlns="" xmlns:a16="http://schemas.microsoft.com/office/drawing/2014/main" id="{145A12D1-E99D-45BB-A29D-7897A4DF90AF}"/>
+                <a16:creationId xmlns:a16="http://schemas.microsoft.com/office/drawing/2014/main" xmlns="" id="{145A12D1-E99D-45BB-A29D-7897A4DF90AF}"/>
               </a:ext>
             </a:extLst>
           </p:cNvPr>
@@ -4692,7 +4920,7 @@
           <p:cNvPr id="3" name="Content Placeholder 2">
             <a:extLst>
               <a:ext uri="{FF2B5EF4-FFF2-40B4-BE49-F238E27FC236}">
-                <a16:creationId xmlns="" xmlns:a16="http://schemas.microsoft.com/office/drawing/2014/main" id="{ECE19EF1-1BBA-40C6-9A9E-BF1B67C2F42A}"/>
+                <a16:creationId xmlns:a16="http://schemas.microsoft.com/office/drawing/2014/main" xmlns="" id="{ECE19EF1-1BBA-40C6-9A9E-BF1B67C2F42A}"/>
               </a:ext>
             </a:extLst>
           </p:cNvPr>
@@ -4756,7 +4984,7 @@
           <p:cNvPr id="4" name="Slide Number Placeholder 3">
             <a:extLst>
               <a:ext uri="{FF2B5EF4-FFF2-40B4-BE49-F238E27FC236}">
-                <a16:creationId xmlns="" xmlns:a16="http://schemas.microsoft.com/office/drawing/2014/main" id="{10327B5A-91B2-4FB2-BDA9-E5AFB948190E}"/>
+                <a16:creationId xmlns:a16="http://schemas.microsoft.com/office/drawing/2014/main" xmlns="" id="{10327B5A-91B2-4FB2-BDA9-E5AFB948190E}"/>
               </a:ext>
             </a:extLst>
           </p:cNvPr>
@@ -4786,7 +5014,7 @@
           <p:cNvPr id="6" name="Picture 5">
             <a:extLst>
               <a:ext uri="{FF2B5EF4-FFF2-40B4-BE49-F238E27FC236}">
-                <a16:creationId xmlns="" xmlns:a16="http://schemas.microsoft.com/office/drawing/2014/main" id="{FE4EADA9-437D-498D-936A-664D2F0BCE60}"/>
+                <a16:creationId xmlns:a16="http://schemas.microsoft.com/office/drawing/2014/main" xmlns="" id="{FE4EADA9-437D-498D-936A-664D2F0BCE60}"/>
               </a:ext>
             </a:extLst>
           </p:cNvPr>
@@ -4816,7 +5044,7 @@
           <p:cNvPr id="7" name="Picture 6">
             <a:extLst>
               <a:ext uri="{FF2B5EF4-FFF2-40B4-BE49-F238E27FC236}">
-                <a16:creationId xmlns="" xmlns:a16="http://schemas.microsoft.com/office/drawing/2014/main" id="{7AA2459E-F688-49E3-9190-F9EA5FAB2128}"/>
+                <a16:creationId xmlns:a16="http://schemas.microsoft.com/office/drawing/2014/main" xmlns="" id="{7AA2459E-F688-49E3-9190-F9EA5FAB2128}"/>
               </a:ext>
             </a:extLst>
           </p:cNvPr>
@@ -4876,7 +5104,7 @@
           <p:cNvPr id="2" name="Title 1">
             <a:extLst>
               <a:ext uri="{FF2B5EF4-FFF2-40B4-BE49-F238E27FC236}">
-                <a16:creationId xmlns="" xmlns:a16="http://schemas.microsoft.com/office/drawing/2014/main" id="{C7F2410F-D49B-4B27-9DED-F96765AD5D00}"/>
+                <a16:creationId xmlns:a16="http://schemas.microsoft.com/office/drawing/2014/main" xmlns="" id="{C7F2410F-D49B-4B27-9DED-F96765AD5D00}"/>
               </a:ext>
             </a:extLst>
           </p:cNvPr>
@@ -4904,7 +5132,7 @@
           <p:cNvPr id="3" name="Content Placeholder 2">
             <a:extLst>
               <a:ext uri="{FF2B5EF4-FFF2-40B4-BE49-F238E27FC236}">
-                <a16:creationId xmlns="" xmlns:a16="http://schemas.microsoft.com/office/drawing/2014/main" id="{FA3F6EBF-5959-4CC3-9E8E-AA3D7EAD9023}"/>
+                <a16:creationId xmlns:a16="http://schemas.microsoft.com/office/drawing/2014/main" xmlns="" id="{FA3F6EBF-5959-4CC3-9E8E-AA3D7EAD9023}"/>
               </a:ext>
             </a:extLst>
           </p:cNvPr>
@@ -4928,8 +5156,16 @@
               <a:t>Preload </a:t>
             </a:r>
             <a:r>
+              <a:rPr lang="en-US" altLang="zh-CN" dirty="0" smtClean="0"/>
+              <a:t>  - </a:t>
+            </a:r>
+            <a:r>
+              <a:rPr lang="zh-TW" altLang="en-US" dirty="0" smtClean="0"/>
+              <a:t>加</a:t>
+            </a:r>
+            <a:r>
               <a:rPr lang="zh-TW" altLang="en-US" dirty="0"/>
-              <a:t>加載資源一般是當前頁面需要的</a:t>
+              <a:t>載資源一般是當前頁面需要的</a:t>
             </a:r>
           </a:p>
           <a:p>
@@ -4945,8 +5181,20 @@
               <a:t> </a:t>
             </a:r>
             <a:r>
+              <a:rPr lang="zh-TW" altLang="en-US" dirty="0" smtClean="0"/>
+              <a:t> </a:t>
+            </a:r>
+            <a:r>
+              <a:rPr lang="en-US" altLang="zh-TW" dirty="0" smtClean="0"/>
+              <a:t>- </a:t>
+            </a:r>
+            <a:r>
+              <a:rPr lang="zh-TW" altLang="en-US" dirty="0" smtClean="0"/>
+              <a:t>一般</a:t>
+            </a:r>
+            <a:r>
               <a:rPr lang="zh-TW" altLang="en-US" dirty="0"/>
-              <a:t>一般是其它頁面有可能用到的資源</a:t>
+              <a:t>是其它頁面有可能用到的資源</a:t>
             </a:r>
             <a:r>
               <a:rPr lang="zh-TW" altLang="en-US" dirty="0" smtClean="0"/>
@@ -5025,7 +5273,7 @@
           <p:cNvPr id="4" name="Slide Number Placeholder 3">
             <a:extLst>
               <a:ext uri="{FF2B5EF4-FFF2-40B4-BE49-F238E27FC236}">
-                <a16:creationId xmlns="" xmlns:a16="http://schemas.microsoft.com/office/drawing/2014/main" id="{C299F954-E019-4723-97BF-A86279FEDB6C}"/>
+                <a16:creationId xmlns:a16="http://schemas.microsoft.com/office/drawing/2014/main" xmlns="" id="{C299F954-E019-4723-97BF-A86279FEDB6C}"/>
               </a:ext>
             </a:extLst>
           </p:cNvPr>
@@ -5085,7 +5333,7 @@
           <p:cNvPr id="2" name="Title 1">
             <a:extLst>
               <a:ext uri="{FF2B5EF4-FFF2-40B4-BE49-F238E27FC236}">
-                <a16:creationId xmlns="" xmlns:a16="http://schemas.microsoft.com/office/drawing/2014/main" id="{EEFBBC0D-0678-4811-BD95-551E2FD100B2}"/>
+                <a16:creationId xmlns:a16="http://schemas.microsoft.com/office/drawing/2014/main" xmlns="" id="{EEFBBC0D-0678-4811-BD95-551E2FD100B2}"/>
               </a:ext>
             </a:extLst>
           </p:cNvPr>
@@ -5113,7 +5361,7 @@
           <p:cNvPr id="3" name="Content Placeholder 2">
             <a:extLst>
               <a:ext uri="{FF2B5EF4-FFF2-40B4-BE49-F238E27FC236}">
-                <a16:creationId xmlns="" xmlns:a16="http://schemas.microsoft.com/office/drawing/2014/main" id="{1396964D-8F0E-402D-9946-096D3E300EBF}"/>
+                <a16:creationId xmlns:a16="http://schemas.microsoft.com/office/drawing/2014/main" xmlns="" id="{1396964D-8F0E-402D-9946-096D3E300EBF}"/>
               </a:ext>
             </a:extLst>
           </p:cNvPr>
@@ -5298,7 +5546,7 @@
           <p:cNvPr id="4" name="Slide Number Placeholder 3">
             <a:extLst>
               <a:ext uri="{FF2B5EF4-FFF2-40B4-BE49-F238E27FC236}">
-                <a16:creationId xmlns="" xmlns:a16="http://schemas.microsoft.com/office/drawing/2014/main" id="{FB3AF34E-9A6B-4083-AEE7-B89599F8FC84}"/>
+                <a16:creationId xmlns:a16="http://schemas.microsoft.com/office/drawing/2014/main" xmlns="" id="{FB3AF34E-9A6B-4083-AEE7-B89599F8FC84}"/>
               </a:ext>
             </a:extLst>
           </p:cNvPr>
@@ -5604,7 +5852,7 @@
           <p:cNvPr id="2" name="Title 1">
             <a:extLst>
               <a:ext uri="{FF2B5EF4-FFF2-40B4-BE49-F238E27FC236}">
-                <a16:creationId xmlns="" xmlns:a16="http://schemas.microsoft.com/office/drawing/2014/main" id="{7729164E-67EC-4794-B348-F6DDCA9C28D8}"/>
+                <a16:creationId xmlns:a16="http://schemas.microsoft.com/office/drawing/2014/main" xmlns="" id="{7729164E-67EC-4794-B348-F6DDCA9C28D8}"/>
               </a:ext>
             </a:extLst>
           </p:cNvPr>
@@ -5632,7 +5880,7 @@
           <p:cNvPr id="3" name="Content Placeholder 2">
             <a:extLst>
               <a:ext uri="{FF2B5EF4-FFF2-40B4-BE49-F238E27FC236}">
-                <a16:creationId xmlns="" xmlns:a16="http://schemas.microsoft.com/office/drawing/2014/main" id="{41B9E139-1138-4192-A779-90DAAD95534B}"/>
+                <a16:creationId xmlns:a16="http://schemas.microsoft.com/office/drawing/2014/main" xmlns="" id="{41B9E139-1138-4192-A779-90DAAD95534B}"/>
               </a:ext>
             </a:extLst>
           </p:cNvPr>
@@ -5668,7 +5916,7 @@
           <p:cNvPr id="4" name="Slide Number Placeholder 3">
             <a:extLst>
               <a:ext uri="{FF2B5EF4-FFF2-40B4-BE49-F238E27FC236}">
-                <a16:creationId xmlns="" xmlns:a16="http://schemas.microsoft.com/office/drawing/2014/main" id="{0B59A355-6DED-46D5-A8B8-4AAEDE751E70}"/>
+                <a16:creationId xmlns:a16="http://schemas.microsoft.com/office/drawing/2014/main" xmlns="" id="{0B59A355-6DED-46D5-A8B8-4AAEDE751E70}"/>
               </a:ext>
             </a:extLst>
           </p:cNvPr>
@@ -6565,6 +6813,12 @@
 </file>
 
 <file path=customXml/item2.xml><?xml version="1.0" encoding="utf-8"?>
+<p:properties xmlns:p="http://schemas.microsoft.com/office/2006/metadata/properties" xmlns:xsi="http://www.w3.org/2001/XMLSchema-instance">
+  <documentManagement/>
+</p:properties>
+</file>
+
+<file path=customXml/item3.xml><?xml version="1.0" encoding="utf-8"?>
 <ct:contentTypeSchema xmlns:ct="http://schemas.microsoft.com/office/2006/metadata/contentType" xmlns:ma="http://schemas.microsoft.com/office/2006/metadata/properties/metaAttributes" ct:_="" ma:_="" ma:contentTypeName="Document" ma:contentTypeID="0x0101005A68C01194ECFA40BC8A96216368DABD" ma:contentTypeVersion="0" ma:contentTypeDescription="Create a new document." ma:contentTypeScope="" ma:versionID="85454c0b708a8704c4fb1830e201d0a8">
   <xsd:schema xmlns:xsd="http://www.w3.org/2001/XMLSchema" xmlns:p="http://schemas.microsoft.com/office/2006/metadata/properties" targetNamespace="http://schemas.microsoft.com/office/2006/metadata/properties" ma:root="true" ma:fieldsID="4aeb20c0e3442673af7ee10786458764">
     <xsd:element name="properties">
@@ -6613,12 +6867,6 @@
 </ct:contentTypeSchema>
 </file>
 
-<file path=customXml/item3.xml><?xml version="1.0" encoding="utf-8"?>
-<p:properties xmlns:p="http://schemas.microsoft.com/office/2006/metadata/properties" xmlns:xsi="http://www.w3.org/2001/XMLSchema-instance">
-  <documentManagement/>
-</p:properties>
-</file>
-
 <file path=customXml/itemProps1.xml><?xml version="1.0" encoding="utf-8"?>
 <ds:datastoreItem xmlns:ds="http://schemas.openxmlformats.org/officeDocument/2006/customXml" ds:itemID="{19046636-0DFE-4791-8294-88FA6F02A45A}">
   <ds:schemaRefs>
@@ -6628,6 +6876,20 @@
 </file>
 
 <file path=customXml/itemProps2.xml><?xml version="1.0" encoding="utf-8"?>
+<ds:datastoreItem xmlns:ds="http://schemas.openxmlformats.org/officeDocument/2006/customXml" ds:itemID="{E81D3889-CFF8-452F-8C7E-972A747945E0}">
+  <ds:schemaRefs>
+    <ds:schemaRef ds:uri="http://schemas.microsoft.com/office/2006/metadata/properties"/>
+    <ds:schemaRef ds:uri="http://purl.org/dc/terms/"/>
+    <ds:schemaRef ds:uri="http://schemas.openxmlformats.org/package/2006/metadata/core-properties"/>
+    <ds:schemaRef ds:uri="http://schemas.microsoft.com/office/2006/documentManagement/types"/>
+    <ds:schemaRef ds:uri="http://purl.org/dc/elements/1.1/"/>
+    <ds:schemaRef ds:uri="http://www.w3.org/XML/1998/namespace"/>
+    <ds:schemaRef ds:uri="http://purl.org/dc/dcmitype/"/>
+  </ds:schemaRefs>
+</ds:datastoreItem>
+</file>
+
+<file path=customXml/itemProps3.xml><?xml version="1.0" encoding="utf-8"?>
 <ds:datastoreItem xmlns:ds="http://schemas.openxmlformats.org/officeDocument/2006/customXml" ds:itemID="{002BD1C4-E85C-4940-BCB3-E960ED1A4E9F}">
   <ds:schemaRefs>
     <ds:schemaRef ds:uri="http://schemas.microsoft.com/office/2006/metadata/contentType"/>
@@ -6640,18 +6902,4 @@
     <ds:schemaRef ds:uri="http://schemas.microsoft.com/office/internal/2005/internalDocumentation"/>
   </ds:schemaRefs>
 </ds:datastoreItem>
-</file>
-
-<file path=customXml/itemProps3.xml><?xml version="1.0" encoding="utf-8"?>
-<ds:datastoreItem xmlns:ds="http://schemas.openxmlformats.org/officeDocument/2006/customXml" ds:itemID="{E81D3889-CFF8-452F-8C7E-972A747945E0}">
-  <ds:schemaRefs>
-    <ds:schemaRef ds:uri="http://schemas.microsoft.com/office/2006/metadata/properties"/>
-    <ds:schemaRef ds:uri="http://purl.org/dc/terms/"/>
-    <ds:schemaRef ds:uri="http://schemas.openxmlformats.org/package/2006/metadata/core-properties"/>
-    <ds:schemaRef ds:uri="http://schemas.microsoft.com/office/2006/documentManagement/types"/>
-    <ds:schemaRef ds:uri="http://purl.org/dc/elements/1.1/"/>
-    <ds:schemaRef ds:uri="http://www.w3.org/XML/1998/namespace"/>
-    <ds:schemaRef ds:uri="http://purl.org/dc/dcmitype/"/>
-  </ds:schemaRefs>
-</ds:datastoreItem>
 </file>
</xml_diff>